<commit_message>
Update main class diagrams
</commit_message>
<xml_diff>
--- a/docs/diagrams/ModelComponentClassDiagram.pptx
+++ b/docs/diagrams/ModelComponentClassDiagram.pptx
@@ -208,7 +208,7 @@
           <a:p>
             <a:fld id="{F5CC4B3F-88C1-4FFA-B1B6-F41C21DC6924}" type="datetimeFigureOut">
               <a:rPr lang="en-US" smtClean="0"/>
-              <a:t>1/1/18</a:t>
+              <a:t>4/15/2018</a:t>
             </a:fld>
             <a:endParaRPr lang="en-US"/>
           </a:p>
@@ -272,38 +272,37 @@
           <a:p>
             <a:pPr lvl="0"/>
             <a:r>
-              <a:rPr lang="en-US" smtClean="0"/>
+              <a:rPr lang="en-US"/>
               <a:t>Click to edit Master text styles</a:t>
             </a:r>
           </a:p>
           <a:p>
             <a:pPr lvl="1"/>
             <a:r>
-              <a:rPr lang="en-US" smtClean="0"/>
+              <a:rPr lang="en-US"/>
               <a:t>Second level</a:t>
             </a:r>
           </a:p>
           <a:p>
             <a:pPr lvl="2"/>
             <a:r>
-              <a:rPr lang="en-US" smtClean="0"/>
+              <a:rPr lang="en-US"/>
               <a:t>Third level</a:t>
             </a:r>
           </a:p>
           <a:p>
             <a:pPr lvl="3"/>
             <a:r>
-              <a:rPr lang="en-US" smtClean="0"/>
+              <a:rPr lang="en-US"/>
               <a:t>Fourth level</a:t>
             </a:r>
           </a:p>
           <a:p>
             <a:pPr lvl="4"/>
             <a:r>
-              <a:rPr lang="en-US" smtClean="0"/>
+              <a:rPr lang="en-US"/>
               <a:t>Fifth level</a:t>
             </a:r>
-            <a:endParaRPr lang="en-US"/>
           </a:p>
         </p:txBody>
       </p:sp>
@@ -514,10 +513,9 @@
           <a:lstStyle/>
           <a:p>
             <a:r>
-              <a:rPr lang="en-US" smtClean="0"/>
+              <a:rPr lang="en-US"/>
               <a:t>Click to edit Master title style</a:t>
             </a:r>
-            <a:endParaRPr lang="en-US"/>
           </a:p>
         </p:txBody>
       </p:sp>
@@ -633,10 +631,9 @@
           </a:lstStyle>
           <a:p>
             <a:r>
-              <a:rPr lang="en-US" smtClean="0"/>
+              <a:rPr lang="en-US"/>
               <a:t>Click to edit Master subtitle style</a:t>
             </a:r>
-            <a:endParaRPr lang="en-US"/>
           </a:p>
         </p:txBody>
       </p:sp>
@@ -657,7 +654,7 @@
           <a:p>
             <a:fld id="{78C97017-6FC3-485B-9764-EAC9E56C1D49}" type="datetimeFigureOut">
               <a:rPr lang="en-US" smtClean="0"/>
-              <a:t>1/1/18</a:t>
+              <a:t>4/15/2018</a:t>
             </a:fld>
             <a:endParaRPr lang="en-US"/>
           </a:p>
@@ -751,10 +748,9 @@
           <a:lstStyle/>
           <a:p>
             <a:r>
-              <a:rPr lang="en-US" smtClean="0"/>
+              <a:rPr lang="en-US"/>
               <a:t>Click to edit Master title style</a:t>
             </a:r>
-            <a:endParaRPr lang="en-US"/>
           </a:p>
         </p:txBody>
       </p:sp>
@@ -775,38 +771,37 @@
           <a:p>
             <a:pPr lvl="0"/>
             <a:r>
-              <a:rPr lang="en-US" smtClean="0"/>
+              <a:rPr lang="en-US"/>
               <a:t>Click to edit Master text styles</a:t>
             </a:r>
           </a:p>
           <a:p>
             <a:pPr lvl="1"/>
             <a:r>
-              <a:rPr lang="en-US" smtClean="0"/>
+              <a:rPr lang="en-US"/>
               <a:t>Second level</a:t>
             </a:r>
           </a:p>
           <a:p>
             <a:pPr lvl="2"/>
             <a:r>
-              <a:rPr lang="en-US" smtClean="0"/>
+              <a:rPr lang="en-US"/>
               <a:t>Third level</a:t>
             </a:r>
           </a:p>
           <a:p>
             <a:pPr lvl="3"/>
             <a:r>
-              <a:rPr lang="en-US" smtClean="0"/>
+              <a:rPr lang="en-US"/>
               <a:t>Fourth level</a:t>
             </a:r>
           </a:p>
           <a:p>
             <a:pPr lvl="4"/>
             <a:r>
-              <a:rPr lang="en-US" smtClean="0"/>
+              <a:rPr lang="en-US"/>
               <a:t>Fifth level</a:t>
             </a:r>
-            <a:endParaRPr lang="en-US"/>
           </a:p>
         </p:txBody>
       </p:sp>
@@ -827,7 +822,7 @@
           <a:p>
             <a:fld id="{78C97017-6FC3-485B-9764-EAC9E56C1D49}" type="datetimeFigureOut">
               <a:rPr lang="en-US" smtClean="0"/>
-              <a:t>1/1/18</a:t>
+              <a:t>4/15/2018</a:t>
             </a:fld>
             <a:endParaRPr lang="en-US"/>
           </a:p>
@@ -926,10 +921,9 @@
           <a:lstStyle/>
           <a:p>
             <a:r>
-              <a:rPr lang="en-US" smtClean="0"/>
+              <a:rPr lang="en-US"/>
               <a:t>Click to edit Master title style</a:t>
             </a:r>
-            <a:endParaRPr lang="en-US"/>
           </a:p>
         </p:txBody>
       </p:sp>
@@ -955,38 +949,37 @@
           <a:p>
             <a:pPr lvl="0"/>
             <a:r>
-              <a:rPr lang="en-US" smtClean="0"/>
+              <a:rPr lang="en-US"/>
               <a:t>Click to edit Master text styles</a:t>
             </a:r>
           </a:p>
           <a:p>
             <a:pPr lvl="1"/>
             <a:r>
-              <a:rPr lang="en-US" smtClean="0"/>
+              <a:rPr lang="en-US"/>
               <a:t>Second level</a:t>
             </a:r>
           </a:p>
           <a:p>
             <a:pPr lvl="2"/>
             <a:r>
-              <a:rPr lang="en-US" smtClean="0"/>
+              <a:rPr lang="en-US"/>
               <a:t>Third level</a:t>
             </a:r>
           </a:p>
           <a:p>
             <a:pPr lvl="3"/>
             <a:r>
-              <a:rPr lang="en-US" smtClean="0"/>
+              <a:rPr lang="en-US"/>
               <a:t>Fourth level</a:t>
             </a:r>
           </a:p>
           <a:p>
             <a:pPr lvl="4"/>
             <a:r>
-              <a:rPr lang="en-US" smtClean="0"/>
+              <a:rPr lang="en-US"/>
               <a:t>Fifth level</a:t>
             </a:r>
-            <a:endParaRPr lang="en-US"/>
           </a:p>
         </p:txBody>
       </p:sp>
@@ -1007,7 +1000,7 @@
           <a:p>
             <a:fld id="{78C97017-6FC3-485B-9764-EAC9E56C1D49}" type="datetimeFigureOut">
               <a:rPr lang="en-US" smtClean="0"/>
-              <a:t>1/1/18</a:t>
+              <a:t>4/15/2018</a:t>
             </a:fld>
             <a:endParaRPr lang="en-US"/>
           </a:p>
@@ -1101,10 +1094,9 @@
           <a:lstStyle/>
           <a:p>
             <a:r>
-              <a:rPr lang="en-US" smtClean="0"/>
+              <a:rPr lang="en-US"/>
               <a:t>Click to edit Master title style</a:t>
             </a:r>
-            <a:endParaRPr lang="en-US"/>
           </a:p>
         </p:txBody>
       </p:sp>
@@ -1125,38 +1117,37 @@
           <a:p>
             <a:pPr lvl="0"/>
             <a:r>
-              <a:rPr lang="en-US" smtClean="0"/>
+              <a:rPr lang="en-US"/>
               <a:t>Click to edit Master text styles</a:t>
             </a:r>
           </a:p>
           <a:p>
             <a:pPr lvl="1"/>
             <a:r>
-              <a:rPr lang="en-US" smtClean="0"/>
+              <a:rPr lang="en-US"/>
               <a:t>Second level</a:t>
             </a:r>
           </a:p>
           <a:p>
             <a:pPr lvl="2"/>
             <a:r>
-              <a:rPr lang="en-US" smtClean="0"/>
+              <a:rPr lang="en-US"/>
               <a:t>Third level</a:t>
             </a:r>
           </a:p>
           <a:p>
             <a:pPr lvl="3"/>
             <a:r>
-              <a:rPr lang="en-US" smtClean="0"/>
+              <a:rPr lang="en-US"/>
               <a:t>Fourth level</a:t>
             </a:r>
           </a:p>
           <a:p>
             <a:pPr lvl="4"/>
             <a:r>
-              <a:rPr lang="en-US" smtClean="0"/>
+              <a:rPr lang="en-US"/>
               <a:t>Fifth level</a:t>
             </a:r>
-            <a:endParaRPr lang="en-US"/>
           </a:p>
         </p:txBody>
       </p:sp>
@@ -1177,7 +1168,7 @@
           <a:p>
             <a:fld id="{78C97017-6FC3-485B-9764-EAC9E56C1D49}" type="datetimeFigureOut">
               <a:rPr lang="en-US" smtClean="0"/>
-              <a:t>1/1/18</a:t>
+              <a:t>4/15/2018</a:t>
             </a:fld>
             <a:endParaRPr lang="en-US"/>
           </a:p>
@@ -1280,10 +1271,9 @@
           </a:lstStyle>
           <a:p>
             <a:r>
-              <a:rPr lang="en-US" smtClean="0"/>
+              <a:rPr lang="en-US"/>
               <a:t>Click to edit Master title style</a:t>
             </a:r>
-            <a:endParaRPr lang="en-US"/>
           </a:p>
         </p:txBody>
       </p:sp>
@@ -1400,7 +1390,7 @@
           <a:p>
             <a:pPr lvl="0"/>
             <a:r>
-              <a:rPr lang="en-US" smtClean="0"/>
+              <a:rPr lang="en-US"/>
               <a:t>Click to edit Master text styles</a:t>
             </a:r>
           </a:p>
@@ -1423,7 +1413,7 @@
           <a:p>
             <a:fld id="{78C97017-6FC3-485B-9764-EAC9E56C1D49}" type="datetimeFigureOut">
               <a:rPr lang="en-US" smtClean="0"/>
-              <a:t>1/1/18</a:t>
+              <a:t>4/15/2018</a:t>
             </a:fld>
             <a:endParaRPr lang="en-US"/>
           </a:p>
@@ -1517,10 +1507,9 @@
           <a:lstStyle/>
           <a:p>
             <a:r>
-              <a:rPr lang="en-US" smtClean="0"/>
+              <a:rPr lang="en-US"/>
               <a:t>Click to edit Master title style</a:t>
             </a:r>
-            <a:endParaRPr lang="en-US"/>
           </a:p>
         </p:txBody>
       </p:sp>
@@ -1574,38 +1563,37 @@
           <a:p>
             <a:pPr lvl="0"/>
             <a:r>
-              <a:rPr lang="en-US" smtClean="0"/>
+              <a:rPr lang="en-US"/>
               <a:t>Click to edit Master text styles</a:t>
             </a:r>
           </a:p>
           <a:p>
             <a:pPr lvl="1"/>
             <a:r>
-              <a:rPr lang="en-US" smtClean="0"/>
+              <a:rPr lang="en-US"/>
               <a:t>Second level</a:t>
             </a:r>
           </a:p>
           <a:p>
             <a:pPr lvl="2"/>
             <a:r>
-              <a:rPr lang="en-US" smtClean="0"/>
+              <a:rPr lang="en-US"/>
               <a:t>Third level</a:t>
             </a:r>
           </a:p>
           <a:p>
             <a:pPr lvl="3"/>
             <a:r>
-              <a:rPr lang="en-US" smtClean="0"/>
+              <a:rPr lang="en-US"/>
               <a:t>Fourth level</a:t>
             </a:r>
           </a:p>
           <a:p>
             <a:pPr lvl="4"/>
             <a:r>
-              <a:rPr lang="en-US" smtClean="0"/>
+              <a:rPr lang="en-US"/>
               <a:t>Fifth level</a:t>
             </a:r>
-            <a:endParaRPr lang="en-US"/>
           </a:p>
         </p:txBody>
       </p:sp>
@@ -1659,38 +1647,37 @@
           <a:p>
             <a:pPr lvl="0"/>
             <a:r>
-              <a:rPr lang="en-US" smtClean="0"/>
+              <a:rPr lang="en-US"/>
               <a:t>Click to edit Master text styles</a:t>
             </a:r>
           </a:p>
           <a:p>
             <a:pPr lvl="1"/>
             <a:r>
-              <a:rPr lang="en-US" smtClean="0"/>
+              <a:rPr lang="en-US"/>
               <a:t>Second level</a:t>
             </a:r>
           </a:p>
           <a:p>
             <a:pPr lvl="2"/>
             <a:r>
-              <a:rPr lang="en-US" smtClean="0"/>
+              <a:rPr lang="en-US"/>
               <a:t>Third level</a:t>
             </a:r>
           </a:p>
           <a:p>
             <a:pPr lvl="3"/>
             <a:r>
-              <a:rPr lang="en-US" smtClean="0"/>
+              <a:rPr lang="en-US"/>
               <a:t>Fourth level</a:t>
             </a:r>
           </a:p>
           <a:p>
             <a:pPr lvl="4"/>
             <a:r>
-              <a:rPr lang="en-US" smtClean="0"/>
+              <a:rPr lang="en-US"/>
               <a:t>Fifth level</a:t>
             </a:r>
-            <a:endParaRPr lang="en-US"/>
           </a:p>
         </p:txBody>
       </p:sp>
@@ -1711,7 +1698,7 @@
           <a:p>
             <a:fld id="{78C97017-6FC3-485B-9764-EAC9E56C1D49}" type="datetimeFigureOut">
               <a:rPr lang="en-US" smtClean="0"/>
-              <a:t>1/1/18</a:t>
+              <a:t>4/15/2018</a:t>
             </a:fld>
             <a:endParaRPr lang="en-US"/>
           </a:p>
@@ -1809,10 +1796,9 @@
           </a:lstStyle>
           <a:p>
             <a:r>
-              <a:rPr lang="en-US" smtClean="0"/>
+              <a:rPr lang="en-US"/>
               <a:t>Click to edit Master title style</a:t>
             </a:r>
-            <a:endParaRPr lang="en-US"/>
           </a:p>
         </p:txBody>
       </p:sp>
@@ -1875,7 +1861,7 @@
           <a:p>
             <a:pPr lvl="0"/>
             <a:r>
-              <a:rPr lang="en-US" smtClean="0"/>
+              <a:rPr lang="en-US"/>
               <a:t>Click to edit Master text styles</a:t>
             </a:r>
           </a:p>
@@ -1931,38 +1917,37 @@
           <a:p>
             <a:pPr lvl="0"/>
             <a:r>
-              <a:rPr lang="en-US" smtClean="0"/>
+              <a:rPr lang="en-US"/>
               <a:t>Click to edit Master text styles</a:t>
             </a:r>
           </a:p>
           <a:p>
             <a:pPr lvl="1"/>
             <a:r>
-              <a:rPr lang="en-US" smtClean="0"/>
+              <a:rPr lang="en-US"/>
               <a:t>Second level</a:t>
             </a:r>
           </a:p>
           <a:p>
             <a:pPr lvl="2"/>
             <a:r>
-              <a:rPr lang="en-US" smtClean="0"/>
+              <a:rPr lang="en-US"/>
               <a:t>Third level</a:t>
             </a:r>
           </a:p>
           <a:p>
             <a:pPr lvl="3"/>
             <a:r>
-              <a:rPr lang="en-US" smtClean="0"/>
+              <a:rPr lang="en-US"/>
               <a:t>Fourth level</a:t>
             </a:r>
           </a:p>
           <a:p>
             <a:pPr lvl="4"/>
             <a:r>
-              <a:rPr lang="en-US" smtClean="0"/>
+              <a:rPr lang="en-US"/>
               <a:t>Fifth level</a:t>
             </a:r>
-            <a:endParaRPr lang="en-US"/>
           </a:p>
         </p:txBody>
       </p:sp>
@@ -2025,7 +2010,7 @@
           <a:p>
             <a:pPr lvl="0"/>
             <a:r>
-              <a:rPr lang="en-US" smtClean="0"/>
+              <a:rPr lang="en-US"/>
               <a:t>Click to edit Master text styles</a:t>
             </a:r>
           </a:p>
@@ -2081,38 +2066,37 @@
           <a:p>
             <a:pPr lvl="0"/>
             <a:r>
-              <a:rPr lang="en-US" smtClean="0"/>
+              <a:rPr lang="en-US"/>
               <a:t>Click to edit Master text styles</a:t>
             </a:r>
           </a:p>
           <a:p>
             <a:pPr lvl="1"/>
             <a:r>
-              <a:rPr lang="en-US" smtClean="0"/>
+              <a:rPr lang="en-US"/>
               <a:t>Second level</a:t>
             </a:r>
           </a:p>
           <a:p>
             <a:pPr lvl="2"/>
             <a:r>
-              <a:rPr lang="en-US" smtClean="0"/>
+              <a:rPr lang="en-US"/>
               <a:t>Third level</a:t>
             </a:r>
           </a:p>
           <a:p>
             <a:pPr lvl="3"/>
             <a:r>
-              <a:rPr lang="en-US" smtClean="0"/>
+              <a:rPr lang="en-US"/>
               <a:t>Fourth level</a:t>
             </a:r>
           </a:p>
           <a:p>
             <a:pPr lvl="4"/>
             <a:r>
-              <a:rPr lang="en-US" smtClean="0"/>
+              <a:rPr lang="en-US"/>
               <a:t>Fifth level</a:t>
             </a:r>
-            <a:endParaRPr lang="en-US"/>
           </a:p>
         </p:txBody>
       </p:sp>
@@ -2133,7 +2117,7 @@
           <a:p>
             <a:fld id="{78C97017-6FC3-485B-9764-EAC9E56C1D49}" type="datetimeFigureOut">
               <a:rPr lang="en-US" smtClean="0"/>
-              <a:t>1/1/18</a:t>
+              <a:t>4/15/2018</a:t>
             </a:fld>
             <a:endParaRPr lang="en-US"/>
           </a:p>
@@ -2227,10 +2211,9 @@
           <a:lstStyle/>
           <a:p>
             <a:r>
-              <a:rPr lang="en-US" smtClean="0"/>
+              <a:rPr lang="en-US"/>
               <a:t>Click to edit Master title style</a:t>
             </a:r>
-            <a:endParaRPr lang="en-US"/>
           </a:p>
         </p:txBody>
       </p:sp>
@@ -2251,7 +2234,7 @@
           <a:p>
             <a:fld id="{78C97017-6FC3-485B-9764-EAC9E56C1D49}" type="datetimeFigureOut">
               <a:rPr lang="en-US" smtClean="0"/>
-              <a:t>1/1/18</a:t>
+              <a:t>4/15/2018</a:t>
             </a:fld>
             <a:endParaRPr lang="en-US"/>
           </a:p>
@@ -2346,7 +2329,7 @@
           <a:p>
             <a:fld id="{78C97017-6FC3-485B-9764-EAC9E56C1D49}" type="datetimeFigureOut">
               <a:rPr lang="en-US" smtClean="0"/>
-              <a:t>1/1/18</a:t>
+              <a:t>4/15/2018</a:t>
             </a:fld>
             <a:endParaRPr lang="en-US"/>
           </a:p>
@@ -2449,10 +2432,9 @@
           </a:lstStyle>
           <a:p>
             <a:r>
-              <a:rPr lang="en-US" smtClean="0"/>
+              <a:rPr lang="en-US"/>
               <a:t>Click to edit Master title style</a:t>
             </a:r>
-            <a:endParaRPr lang="en-US"/>
           </a:p>
         </p:txBody>
       </p:sp>
@@ -2506,38 +2488,37 @@
           <a:p>
             <a:pPr lvl="0"/>
             <a:r>
-              <a:rPr lang="en-US" smtClean="0"/>
+              <a:rPr lang="en-US"/>
               <a:t>Click to edit Master text styles</a:t>
             </a:r>
           </a:p>
           <a:p>
             <a:pPr lvl="1"/>
             <a:r>
-              <a:rPr lang="en-US" smtClean="0"/>
+              <a:rPr lang="en-US"/>
               <a:t>Second level</a:t>
             </a:r>
           </a:p>
           <a:p>
             <a:pPr lvl="2"/>
             <a:r>
-              <a:rPr lang="en-US" smtClean="0"/>
+              <a:rPr lang="en-US"/>
               <a:t>Third level</a:t>
             </a:r>
           </a:p>
           <a:p>
             <a:pPr lvl="3"/>
             <a:r>
-              <a:rPr lang="en-US" smtClean="0"/>
+              <a:rPr lang="en-US"/>
               <a:t>Fourth level</a:t>
             </a:r>
           </a:p>
           <a:p>
             <a:pPr lvl="4"/>
             <a:r>
-              <a:rPr lang="en-US" smtClean="0"/>
+              <a:rPr lang="en-US"/>
               <a:t>Fifth level</a:t>
             </a:r>
-            <a:endParaRPr lang="en-US"/>
           </a:p>
         </p:txBody>
       </p:sp>
@@ -2600,7 +2581,7 @@
           <a:p>
             <a:pPr lvl="0"/>
             <a:r>
-              <a:rPr lang="en-US" smtClean="0"/>
+              <a:rPr lang="en-US"/>
               <a:t>Click to edit Master text styles</a:t>
             </a:r>
           </a:p>
@@ -2623,7 +2604,7 @@
           <a:p>
             <a:fld id="{78C97017-6FC3-485B-9764-EAC9E56C1D49}" type="datetimeFigureOut">
               <a:rPr lang="en-US" smtClean="0"/>
-              <a:t>1/1/18</a:t>
+              <a:t>4/15/2018</a:t>
             </a:fld>
             <a:endParaRPr lang="en-US"/>
           </a:p>
@@ -2726,10 +2707,9 @@
           </a:lstStyle>
           <a:p>
             <a:r>
-              <a:rPr lang="en-US" smtClean="0"/>
+              <a:rPr lang="en-US"/>
               <a:t>Click to edit Master title style</a:t>
             </a:r>
-            <a:endParaRPr lang="en-US"/>
           </a:p>
         </p:txBody>
       </p:sp>
@@ -2853,7 +2833,7 @@
           <a:p>
             <a:pPr lvl="0"/>
             <a:r>
-              <a:rPr lang="en-US" smtClean="0"/>
+              <a:rPr lang="en-US"/>
               <a:t>Click to edit Master text styles</a:t>
             </a:r>
           </a:p>
@@ -2876,7 +2856,7 @@
           <a:p>
             <a:fld id="{78C97017-6FC3-485B-9764-EAC9E56C1D49}" type="datetimeFigureOut">
               <a:rPr lang="en-US" smtClean="0"/>
-              <a:t>1/1/18</a:t>
+              <a:t>4/15/2018</a:t>
             </a:fld>
             <a:endParaRPr lang="en-US"/>
           </a:p>
@@ -2985,10 +2965,9 @@
           <a:lstStyle/>
           <a:p>
             <a:r>
-              <a:rPr lang="en-US" smtClean="0"/>
+              <a:rPr lang="en-US"/>
               <a:t>Click to edit Master title style</a:t>
             </a:r>
-            <a:endParaRPr lang="en-US"/>
           </a:p>
         </p:txBody>
       </p:sp>
@@ -3019,38 +2998,37 @@
           <a:p>
             <a:pPr lvl="0"/>
             <a:r>
-              <a:rPr lang="en-US" smtClean="0"/>
+              <a:rPr lang="en-US"/>
               <a:t>Click to edit Master text styles</a:t>
             </a:r>
           </a:p>
           <a:p>
             <a:pPr lvl="1"/>
             <a:r>
-              <a:rPr lang="en-US" smtClean="0"/>
+              <a:rPr lang="en-US"/>
               <a:t>Second level</a:t>
             </a:r>
           </a:p>
           <a:p>
             <a:pPr lvl="2"/>
             <a:r>
-              <a:rPr lang="en-US" smtClean="0"/>
+              <a:rPr lang="en-US"/>
               <a:t>Third level</a:t>
             </a:r>
           </a:p>
           <a:p>
             <a:pPr lvl="3"/>
             <a:r>
-              <a:rPr lang="en-US" smtClean="0"/>
+              <a:rPr lang="en-US"/>
               <a:t>Fourth level</a:t>
             </a:r>
           </a:p>
           <a:p>
             <a:pPr lvl="4"/>
             <a:r>
-              <a:rPr lang="en-US" smtClean="0"/>
+              <a:rPr lang="en-US"/>
               <a:t>Fifth level</a:t>
             </a:r>
-            <a:endParaRPr lang="en-US"/>
           </a:p>
         </p:txBody>
       </p:sp>
@@ -3089,7 +3067,7 @@
           <a:p>
             <a:fld id="{78C97017-6FC3-485B-9764-EAC9E56C1D49}" type="datetimeFigureOut">
               <a:rPr lang="en-US" smtClean="0"/>
-              <a:t>1/1/18</a:t>
+              <a:t>4/15/2018</a:t>
             </a:fld>
             <a:endParaRPr lang="en-US"/>
           </a:p>
@@ -3473,7 +3451,7 @@
         <p:spPr>
           <a:xfrm>
             <a:off x="1119865" y="1727200"/>
-            <a:ext cx="7490735" cy="2997200"/>
+            <a:ext cx="7490735" cy="3987800"/>
           </a:xfrm>
           <a:prstGeom prst="roundRect">
             <a:avLst>
@@ -3510,7 +3488,7 @@
           <a:lstStyle/>
           <a:p>
             <a:r>
-              <a:rPr lang="en-US" sz="1200" b="1" dirty="0" smtClean="0">
+              <a:rPr lang="en-US" sz="1200" b="1" dirty="0">
                 <a:solidFill>
                   <a:srgbClr val="7030A0"/>
                 </a:solidFill>
@@ -3569,7 +3547,7 @@
           <a:p>
             <a:pPr algn="ctr"/>
             <a:r>
-              <a:rPr lang="en-US" sz="1050" dirty="0" err="1" smtClean="0">
+              <a:rPr lang="en-US" sz="1050" dirty="0" err="1">
                 <a:solidFill>
                   <a:schemeClr val="bg1"/>
                 </a:solidFill>
@@ -3628,7 +3606,7 @@
           <a:p>
             <a:pPr algn="ctr"/>
             <a:r>
-              <a:rPr lang="en-US" sz="1050" dirty="0" err="1" smtClean="0">
+              <a:rPr lang="en-US" sz="1050" dirty="0" err="1">
                 <a:solidFill>
                   <a:schemeClr val="bg1"/>
                 </a:solidFill>
@@ -3742,7 +3720,7 @@
           <a:p>
             <a:pPr algn="ctr"/>
             <a:r>
-              <a:rPr lang="en-US" sz="1050" dirty="0" smtClean="0">
+              <a:rPr lang="en-US" sz="1050" dirty="0">
                 <a:solidFill>
                   <a:schemeClr val="bg1"/>
                 </a:solidFill>
@@ -4015,7 +3993,7 @@
           <a:p>
             <a:pPr algn="ctr"/>
             <a:r>
-              <a:rPr lang="en-US" sz="1050" dirty="0" err="1" smtClean="0">
+              <a:rPr lang="en-US" sz="1050" dirty="0" err="1">
                 <a:solidFill>
                   <a:srgbClr val="7030A0"/>
                 </a:solidFill>
@@ -4157,7 +4135,7 @@
           <a:p>
             <a:pPr algn="ctr"/>
             <a:r>
-              <a:rPr lang="en-US" sz="1050" dirty="0" err="1" smtClean="0">
+              <a:rPr lang="en-US" sz="1050" dirty="0" err="1">
                 <a:solidFill>
                   <a:srgbClr val="7030A0"/>
                 </a:solidFill>
@@ -4301,7 +4279,7 @@
           <a:p>
             <a:pPr algn="ctr"/>
             <a:r>
-              <a:rPr lang="en-US" sz="1050" dirty="0" err="1" smtClean="0">
+              <a:rPr lang="en-US" sz="1050" dirty="0" err="1">
                 <a:solidFill>
                   <a:srgbClr val="7030A0"/>
                 </a:solidFill>
@@ -4400,7 +4378,7 @@
           <a:p>
             <a:pPr algn="ctr"/>
             <a:r>
-              <a:rPr lang="en-US" sz="1050" dirty="0" smtClean="0">
+              <a:rPr lang="en-US" sz="1050" dirty="0">
                 <a:solidFill>
                   <a:srgbClr val="7030A0"/>
                 </a:solidFill>
@@ -4542,7 +4520,7 @@
           <a:p>
             <a:pPr algn="ctr"/>
             <a:r>
-              <a:rPr lang="en-US" sz="1050" dirty="0" smtClean="0">
+              <a:rPr lang="en-US" sz="1050" dirty="0">
                 <a:solidFill>
                   <a:srgbClr val="7030A0"/>
                 </a:solidFill>
@@ -4684,7 +4662,7 @@
           <a:p>
             <a:pPr algn="ctr"/>
             <a:r>
-              <a:rPr lang="en-US" sz="1050" dirty="0" smtClean="0">
+              <a:rPr lang="en-US" sz="1050" dirty="0">
                 <a:solidFill>
                   <a:srgbClr val="7030A0"/>
                 </a:solidFill>
@@ -4828,7 +4806,7 @@
           <a:p>
             <a:pPr algn="ctr"/>
             <a:r>
-              <a:rPr lang="en-US" sz="1050" dirty="0" smtClean="0">
+              <a:rPr lang="en-US" sz="1050" dirty="0">
                 <a:solidFill>
                   <a:srgbClr val="7030A0"/>
                 </a:solidFill>
@@ -4925,7 +4903,7 @@
           <a:p>
             <a:pPr algn="ctr"/>
             <a:r>
-              <a:rPr lang="en-US" sz="1050" dirty="0" smtClean="0">
+              <a:rPr lang="en-US" sz="1050" dirty="0">
                 <a:solidFill>
                   <a:srgbClr val="7030A0"/>
                 </a:solidFill>
@@ -5022,7 +5000,7 @@
           <a:p>
             <a:pPr algn="ctr"/>
             <a:r>
-              <a:rPr lang="en-US" sz="1050" dirty="0" smtClean="0">
+              <a:rPr lang="en-US" sz="1050" dirty="0">
                 <a:solidFill>
                   <a:srgbClr val="7030A0"/>
                 </a:solidFill>
@@ -5041,6 +5019,7 @@
         <p:nvCxnSpPr>
           <p:cNvPr id="86" name="Elbow Connector 85"/>
           <p:cNvCxnSpPr>
+            <a:cxnSpLocks/>
             <a:stCxn id="78" idx="3"/>
             <a:endCxn id="85" idx="1"/>
           </p:cNvCxnSpPr>
@@ -5210,7 +5189,7 @@
           <a:p>
             <a:pPr algn="ctr"/>
             <a:r>
-              <a:rPr lang="en-US" sz="1050" dirty="0" smtClean="0">
+              <a:rPr lang="en-US" sz="1050" dirty="0">
                 <a:solidFill>
                   <a:srgbClr val="7030A0"/>
                 </a:solidFill>
@@ -5218,14 +5197,14 @@
               <a:t>&lt;&lt;interface&gt;&gt;</a:t>
             </a:r>
             <a:br>
-              <a:rPr lang="en-US" sz="1050" dirty="0" smtClean="0">
+              <a:rPr lang="en-US" sz="1050" dirty="0">
                 <a:solidFill>
                   <a:srgbClr val="7030A0"/>
                 </a:solidFill>
               </a:rPr>
             </a:br>
             <a:r>
-              <a:rPr lang="en-US" sz="1050" dirty="0" err="1" smtClean="0">
+              <a:rPr lang="en-US" sz="1050" dirty="0" err="1">
                 <a:solidFill>
                   <a:srgbClr val="7030A0"/>
                 </a:solidFill>
@@ -5264,7 +5243,7 @@
           <a:p>
             <a:pPr algn="r"/>
             <a:r>
-              <a:rPr lang="en-US" sz="1100" dirty="0" smtClean="0">
+              <a:rPr lang="en-US" sz="1100" dirty="0">
                 <a:solidFill>
                   <a:srgbClr val="7030A0"/>
                 </a:solidFill>
@@ -5320,20 +5299,12 @@
           <a:p>
             <a:pPr algn="ctr"/>
             <a:r>
-              <a:rPr lang="en-US" sz="1050" dirty="0" smtClean="0">
+              <a:rPr lang="en-US" sz="1050" dirty="0">
                 <a:solidFill>
                   <a:srgbClr val="7030A0"/>
                 </a:solidFill>
               </a:rPr>
               <a:t>&lt;&lt;interface&gt;&gt;</a:t>
-            </a:r>
-            <a:r>
-              <a:rPr lang="en-US" sz="1050">
-                <a:solidFill>
-                  <a:srgbClr val="7030A0"/>
-                </a:solidFill>
-              </a:rPr>
-              <a:t/>
             </a:r>
             <a:br>
               <a:rPr lang="en-US" sz="1050">
@@ -5343,7 +5314,7 @@
               </a:rPr>
             </a:br>
             <a:r>
-              <a:rPr lang="en-US" sz="1050" dirty="0" err="1" smtClean="0">
+              <a:rPr lang="en-US" sz="1050" dirty="0" err="1">
                 <a:solidFill>
                   <a:srgbClr val="7030A0"/>
                 </a:solidFill>
@@ -5465,7 +5436,7 @@
           <a:p>
             <a:pPr algn="ctr"/>
             <a:r>
-              <a:rPr lang="en-US" sz="1100" dirty="0" smtClean="0">
+              <a:rPr lang="en-US" sz="1100" dirty="0">
                 <a:solidFill>
                   <a:srgbClr val="7030A0"/>
                 </a:solidFill>
@@ -5504,7 +5475,7 @@
           <a:p>
             <a:pPr algn="ctr"/>
             <a:r>
-              <a:rPr lang="en-US" sz="1100" dirty="0" smtClean="0">
+              <a:rPr lang="en-US" sz="1100" dirty="0">
                 <a:solidFill>
                   <a:srgbClr val="7030A0"/>
                 </a:solidFill>
@@ -5543,7 +5514,7 @@
           <a:p>
             <a:pPr algn="ctr"/>
             <a:r>
-              <a:rPr lang="en-US" sz="1100" dirty="0" smtClean="0">
+              <a:rPr lang="en-US" sz="1100" dirty="0">
                 <a:solidFill>
                   <a:srgbClr val="7030A0"/>
                 </a:solidFill>
@@ -5582,7 +5553,7 @@
           <a:p>
             <a:pPr algn="ctr"/>
             <a:r>
-              <a:rPr lang="en-US" sz="1100" dirty="0" smtClean="0">
+              <a:rPr lang="en-US" sz="1100" dirty="0">
                 <a:solidFill>
                   <a:srgbClr val="7030A0"/>
                 </a:solidFill>
@@ -5621,7 +5592,7 @@
           <a:p>
             <a:pPr algn="ctr"/>
             <a:r>
-              <a:rPr lang="en-US" sz="1100" dirty="0" smtClean="0">
+              <a:rPr lang="en-US" sz="1100" dirty="0">
                 <a:solidFill>
                   <a:srgbClr val="7030A0"/>
                 </a:solidFill>
@@ -5660,7 +5631,7 @@
           <a:p>
             <a:pPr algn="ctr"/>
             <a:r>
-              <a:rPr lang="en-US" sz="1100" dirty="0" smtClean="0">
+              <a:rPr lang="en-US" sz="1100" dirty="0">
                 <a:solidFill>
                   <a:srgbClr val="7030A0"/>
                 </a:solidFill>
@@ -5699,7 +5670,7 @@
           <a:p>
             <a:pPr algn="ctr"/>
             <a:r>
-              <a:rPr lang="en-US" sz="1100" dirty="0" smtClean="0">
+              <a:rPr lang="en-US" sz="1100" dirty="0">
                 <a:solidFill>
                   <a:srgbClr val="7030A0"/>
                 </a:solidFill>
@@ -5738,7 +5709,7 @@
           <a:p>
             <a:pPr algn="ctr"/>
             <a:r>
-              <a:rPr lang="en-US" sz="1100" dirty="0" smtClean="0">
+              <a:rPr lang="en-US" sz="1100" dirty="0">
                 <a:solidFill>
                   <a:srgbClr val="7030A0"/>
                 </a:solidFill>
@@ -5753,6 +5724,1005 @@
           </a:p>
         </p:txBody>
       </p:sp>
+      <p:sp>
+        <p:nvSpPr>
+          <p:cNvPr id="52" name="Rectangle 8">
+            <a:extLst>
+              <a:ext uri="{FF2B5EF4-FFF2-40B4-BE49-F238E27FC236}">
+                <a16:creationId xmlns:a16="http://schemas.microsoft.com/office/drawing/2014/main" id="{BA1B2F1D-58EE-4BE3-B894-6EEAA49178A2}"/>
+              </a:ext>
+            </a:extLst>
+          </p:cNvPr>
+          <p:cNvSpPr/>
+          <p:nvPr/>
+        </p:nvSpPr>
+        <p:spPr>
+          <a:xfrm>
+            <a:off x="7719771" y="3854242"/>
+            <a:ext cx="708186" cy="285783"/>
+          </a:xfrm>
+          <a:prstGeom prst="rect">
+            <a:avLst/>
+          </a:prstGeom>
+          <a:ln w="19050">
+            <a:solidFill>
+              <a:srgbClr val="7030A0"/>
+            </a:solidFill>
+          </a:ln>
+          <a:effectLst/>
+        </p:spPr>
+        <p:style>
+          <a:lnRef idx="1">
+            <a:schemeClr val="accent4"/>
+          </a:lnRef>
+          <a:fillRef idx="2">
+            <a:schemeClr val="accent4"/>
+          </a:fillRef>
+          <a:effectRef idx="1">
+            <a:schemeClr val="accent4"/>
+          </a:effectRef>
+          <a:fontRef idx="minor">
+            <a:schemeClr val="dk1"/>
+          </a:fontRef>
+        </p:style>
+        <p:txBody>
+          <a:bodyPr rtlCol="0" anchor="ctr"/>
+          <a:lstStyle/>
+          <a:p>
+            <a:pPr algn="ctr"/>
+            <a:r>
+              <a:rPr lang="en-US" sz="1050" dirty="0">
+                <a:solidFill>
+                  <a:srgbClr val="7030A0"/>
+                </a:solidFill>
+              </a:rPr>
+              <a:t>Rating</a:t>
+            </a:r>
+            <a:endParaRPr lang="en-SG" sz="1050" dirty="0">
+              <a:solidFill>
+                <a:srgbClr val="7030A0"/>
+              </a:solidFill>
+            </a:endParaRPr>
+          </a:p>
+        </p:txBody>
+      </p:sp>
+      <p:sp>
+        <p:nvSpPr>
+          <p:cNvPr id="53" name="Rectangle 8">
+            <a:extLst>
+              <a:ext uri="{FF2B5EF4-FFF2-40B4-BE49-F238E27FC236}">
+                <a16:creationId xmlns:a16="http://schemas.microsoft.com/office/drawing/2014/main" id="{B9788DB3-8CA0-4E2E-8F3D-AB95D91D5678}"/>
+              </a:ext>
+            </a:extLst>
+          </p:cNvPr>
+          <p:cNvSpPr/>
+          <p:nvPr/>
+        </p:nvSpPr>
+        <p:spPr>
+          <a:xfrm>
+            <a:off x="7719771" y="4170456"/>
+            <a:ext cx="708186" cy="285783"/>
+          </a:xfrm>
+          <a:prstGeom prst="rect">
+            <a:avLst/>
+          </a:prstGeom>
+          <a:ln w="19050">
+            <a:solidFill>
+              <a:srgbClr val="7030A0"/>
+            </a:solidFill>
+          </a:ln>
+          <a:effectLst/>
+        </p:spPr>
+        <p:style>
+          <a:lnRef idx="1">
+            <a:schemeClr val="accent4"/>
+          </a:lnRef>
+          <a:fillRef idx="2">
+            <a:schemeClr val="accent4"/>
+          </a:fillRef>
+          <a:effectRef idx="1">
+            <a:schemeClr val="accent4"/>
+          </a:effectRef>
+          <a:fontRef idx="minor">
+            <a:schemeClr val="dk1"/>
+          </a:fontRef>
+        </p:style>
+        <p:txBody>
+          <a:bodyPr rtlCol="0" anchor="ctr"/>
+          <a:lstStyle/>
+          <a:p>
+            <a:pPr algn="ctr"/>
+            <a:r>
+              <a:rPr lang="en-US" sz="1050" dirty="0">
+                <a:solidFill>
+                  <a:srgbClr val="7030A0"/>
+                </a:solidFill>
+              </a:rPr>
+              <a:t>Position</a:t>
+            </a:r>
+            <a:endParaRPr lang="en-SG" sz="1050" dirty="0">
+              <a:solidFill>
+                <a:srgbClr val="7030A0"/>
+              </a:solidFill>
+            </a:endParaRPr>
+          </a:p>
+        </p:txBody>
+      </p:sp>
+      <p:sp>
+        <p:nvSpPr>
+          <p:cNvPr id="55" name="Rectangle 8">
+            <a:extLst>
+              <a:ext uri="{FF2B5EF4-FFF2-40B4-BE49-F238E27FC236}">
+                <a16:creationId xmlns:a16="http://schemas.microsoft.com/office/drawing/2014/main" id="{CE0AF556-245A-4B07-BA5E-D00BB5D7C15A}"/>
+              </a:ext>
+            </a:extLst>
+          </p:cNvPr>
+          <p:cNvSpPr/>
+          <p:nvPr/>
+        </p:nvSpPr>
+        <p:spPr>
+          <a:xfrm>
+            <a:off x="7722754" y="4520376"/>
+            <a:ext cx="708186" cy="285783"/>
+          </a:xfrm>
+          <a:prstGeom prst="rect">
+            <a:avLst/>
+          </a:prstGeom>
+          <a:ln w="19050">
+            <a:solidFill>
+              <a:srgbClr val="7030A0"/>
+            </a:solidFill>
+          </a:ln>
+          <a:effectLst/>
+        </p:spPr>
+        <p:style>
+          <a:lnRef idx="1">
+            <a:schemeClr val="accent4"/>
+          </a:lnRef>
+          <a:fillRef idx="2">
+            <a:schemeClr val="accent4"/>
+          </a:fillRef>
+          <a:effectRef idx="1">
+            <a:schemeClr val="accent4"/>
+          </a:effectRef>
+          <a:fontRef idx="minor">
+            <a:schemeClr val="dk1"/>
+          </a:fontRef>
+        </p:style>
+        <p:txBody>
+          <a:bodyPr rtlCol="0" anchor="ctr"/>
+          <a:lstStyle/>
+          <a:p>
+            <a:pPr algn="ctr"/>
+            <a:r>
+              <a:rPr lang="en-US" sz="1050" dirty="0">
+                <a:solidFill>
+                  <a:srgbClr val="7030A0"/>
+                </a:solidFill>
+              </a:rPr>
+              <a:t>Avatar</a:t>
+            </a:r>
+            <a:endParaRPr lang="en-SG" sz="1050" dirty="0">
+              <a:solidFill>
+                <a:srgbClr val="7030A0"/>
+              </a:solidFill>
+            </a:endParaRPr>
+          </a:p>
+        </p:txBody>
+      </p:sp>
+      <p:cxnSp>
+        <p:nvCxnSpPr>
+          <p:cNvPr id="71" name="Elbow Connector 85">
+            <a:extLst>
+              <a:ext uri="{FF2B5EF4-FFF2-40B4-BE49-F238E27FC236}">
+                <a16:creationId xmlns:a16="http://schemas.microsoft.com/office/drawing/2014/main" id="{1B7020ED-C92E-464D-8D39-75AA3D640E0A}"/>
+              </a:ext>
+            </a:extLst>
+          </p:cNvPr>
+          <p:cNvCxnSpPr>
+            <a:cxnSpLocks/>
+            <a:endCxn id="52" idx="1"/>
+          </p:cNvCxnSpPr>
+          <p:nvPr/>
+        </p:nvCxnSpPr>
+        <p:spPr>
+          <a:xfrm rot="16200000" flipH="1">
+            <a:off x="7167317" y="3444680"/>
+            <a:ext cx="880334" cy="224573"/>
+          </a:xfrm>
+          <a:prstGeom prst="bentConnector2">
+            <a:avLst/>
+          </a:prstGeom>
+          <a:ln w="19050">
+            <a:solidFill>
+              <a:srgbClr val="7030A0"/>
+            </a:solidFill>
+            <a:headEnd type="none" w="med" len="med"/>
+            <a:tailEnd type="arrow" w="med" len="med"/>
+          </a:ln>
+          <a:effectLst/>
+        </p:spPr>
+        <p:style>
+          <a:lnRef idx="1">
+            <a:schemeClr val="accent2"/>
+          </a:lnRef>
+          <a:fillRef idx="2">
+            <a:schemeClr val="accent2"/>
+          </a:fillRef>
+          <a:effectRef idx="1">
+            <a:schemeClr val="accent2"/>
+          </a:effectRef>
+          <a:fontRef idx="minor">
+            <a:schemeClr val="dk1"/>
+          </a:fontRef>
+        </p:style>
+      </p:cxnSp>
+      <p:cxnSp>
+        <p:nvCxnSpPr>
+          <p:cNvPr id="73" name="Elbow Connector 85">
+            <a:extLst>
+              <a:ext uri="{FF2B5EF4-FFF2-40B4-BE49-F238E27FC236}">
+                <a16:creationId xmlns:a16="http://schemas.microsoft.com/office/drawing/2014/main" id="{A5BAF3B2-22EB-4910-BF7B-F1D83A2A4D9E}"/>
+              </a:ext>
+            </a:extLst>
+          </p:cNvPr>
+          <p:cNvCxnSpPr>
+            <a:cxnSpLocks/>
+          </p:cNvCxnSpPr>
+          <p:nvPr/>
+        </p:nvCxnSpPr>
+        <p:spPr>
+          <a:xfrm rot="16200000" flipH="1">
+            <a:off x="7161930" y="3767763"/>
+            <a:ext cx="880334" cy="224573"/>
+          </a:xfrm>
+          <a:prstGeom prst="bentConnector2">
+            <a:avLst/>
+          </a:prstGeom>
+          <a:ln w="19050">
+            <a:solidFill>
+              <a:srgbClr val="7030A0"/>
+            </a:solidFill>
+            <a:headEnd type="none" w="med" len="med"/>
+            <a:tailEnd type="arrow" w="med" len="med"/>
+          </a:ln>
+          <a:effectLst/>
+        </p:spPr>
+        <p:style>
+          <a:lnRef idx="1">
+            <a:schemeClr val="accent2"/>
+          </a:lnRef>
+          <a:fillRef idx="2">
+            <a:schemeClr val="accent2"/>
+          </a:fillRef>
+          <a:effectRef idx="1">
+            <a:schemeClr val="accent2"/>
+          </a:effectRef>
+          <a:fontRef idx="minor">
+            <a:schemeClr val="dk1"/>
+          </a:fontRef>
+        </p:style>
+      </p:cxnSp>
+      <p:cxnSp>
+        <p:nvCxnSpPr>
+          <p:cNvPr id="74" name="Elbow Connector 85">
+            <a:extLst>
+              <a:ext uri="{FF2B5EF4-FFF2-40B4-BE49-F238E27FC236}">
+                <a16:creationId xmlns:a16="http://schemas.microsoft.com/office/drawing/2014/main" id="{C2D05A63-0FF0-4681-8B93-5C88FC643614}"/>
+              </a:ext>
+            </a:extLst>
+          </p:cNvPr>
+          <p:cNvCxnSpPr>
+            <a:cxnSpLocks/>
+          </p:cNvCxnSpPr>
+          <p:nvPr/>
+        </p:nvCxnSpPr>
+        <p:spPr>
+          <a:xfrm rot="16200000" flipH="1">
+            <a:off x="7164065" y="4119788"/>
+            <a:ext cx="880334" cy="224573"/>
+          </a:xfrm>
+          <a:prstGeom prst="bentConnector2">
+            <a:avLst/>
+          </a:prstGeom>
+          <a:ln w="19050">
+            <a:solidFill>
+              <a:srgbClr val="7030A0"/>
+            </a:solidFill>
+            <a:headEnd type="none" w="med" len="med"/>
+            <a:tailEnd type="arrow" w="med" len="med"/>
+          </a:ln>
+          <a:effectLst/>
+        </p:spPr>
+        <p:style>
+          <a:lnRef idx="1">
+            <a:schemeClr val="accent2"/>
+          </a:lnRef>
+          <a:fillRef idx="2">
+            <a:schemeClr val="accent2"/>
+          </a:fillRef>
+          <a:effectRef idx="1">
+            <a:schemeClr val="accent2"/>
+          </a:effectRef>
+          <a:fontRef idx="minor">
+            <a:schemeClr val="dk1"/>
+          </a:fontRef>
+        </p:style>
+      </p:cxnSp>
+      <p:sp>
+        <p:nvSpPr>
+          <p:cNvPr id="77" name="Rectangle 8">
+            <a:extLst>
+              <a:ext uri="{FF2B5EF4-FFF2-40B4-BE49-F238E27FC236}">
+                <a16:creationId xmlns:a16="http://schemas.microsoft.com/office/drawing/2014/main" id="{EE3494BC-E4C1-45E3-AB75-644644BB4186}"/>
+              </a:ext>
+            </a:extLst>
+          </p:cNvPr>
+          <p:cNvSpPr/>
+          <p:nvPr/>
+        </p:nvSpPr>
+        <p:spPr>
+          <a:xfrm>
+            <a:off x="5945628" y="5065690"/>
+            <a:ext cx="708186" cy="346760"/>
+          </a:xfrm>
+          <a:prstGeom prst="rect">
+            <a:avLst/>
+          </a:prstGeom>
+          <a:ln w="19050">
+            <a:solidFill>
+              <a:srgbClr val="7030A0"/>
+            </a:solidFill>
+          </a:ln>
+          <a:effectLst/>
+        </p:spPr>
+        <p:style>
+          <a:lnRef idx="1">
+            <a:schemeClr val="accent4"/>
+          </a:lnRef>
+          <a:fillRef idx="2">
+            <a:schemeClr val="accent4"/>
+          </a:fillRef>
+          <a:effectRef idx="1">
+            <a:schemeClr val="accent4"/>
+          </a:effectRef>
+          <a:fontRef idx="minor">
+            <a:schemeClr val="dk1"/>
+          </a:fontRef>
+        </p:style>
+        <p:txBody>
+          <a:bodyPr rtlCol="0" anchor="ctr"/>
+          <a:lstStyle/>
+          <a:p>
+            <a:pPr algn="ctr"/>
+            <a:r>
+              <a:rPr lang="en-US" sz="1050" dirty="0">
+                <a:solidFill>
+                  <a:srgbClr val="7030A0"/>
+                </a:solidFill>
+              </a:rPr>
+              <a:t>Team</a:t>
+            </a:r>
+          </a:p>
+        </p:txBody>
+      </p:sp>
+      <p:sp>
+        <p:nvSpPr>
+          <p:cNvPr id="82" name="Rectangle 8">
+            <a:extLst>
+              <a:ext uri="{FF2B5EF4-FFF2-40B4-BE49-F238E27FC236}">
+                <a16:creationId xmlns:a16="http://schemas.microsoft.com/office/drawing/2014/main" id="{3A9E2656-A93B-4FDA-8792-50E18577BBA0}"/>
+              </a:ext>
+            </a:extLst>
+          </p:cNvPr>
+          <p:cNvSpPr/>
+          <p:nvPr/>
+        </p:nvSpPr>
+        <p:spPr>
+          <a:xfrm>
+            <a:off x="5575821" y="4229782"/>
+            <a:ext cx="1447800" cy="346760"/>
+          </a:xfrm>
+          <a:prstGeom prst="rect">
+            <a:avLst/>
+          </a:prstGeom>
+          <a:ln w="19050">
+            <a:solidFill>
+              <a:srgbClr val="7030A0"/>
+            </a:solidFill>
+          </a:ln>
+          <a:effectLst/>
+        </p:spPr>
+        <p:style>
+          <a:lnRef idx="1">
+            <a:schemeClr val="accent4"/>
+          </a:lnRef>
+          <a:fillRef idx="2">
+            <a:schemeClr val="accent4"/>
+          </a:fillRef>
+          <a:effectRef idx="1">
+            <a:schemeClr val="accent4"/>
+          </a:effectRef>
+          <a:fontRef idx="minor">
+            <a:schemeClr val="dk1"/>
+          </a:fontRef>
+        </p:style>
+        <p:txBody>
+          <a:bodyPr rtlCol="0" anchor="ctr"/>
+          <a:lstStyle/>
+          <a:p>
+            <a:pPr algn="ctr"/>
+            <a:r>
+              <a:rPr lang="en-US" sz="1050" dirty="0" err="1">
+                <a:solidFill>
+                  <a:srgbClr val="7030A0"/>
+                </a:solidFill>
+              </a:rPr>
+              <a:t>UniquePersonList</a:t>
+            </a:r>
+            <a:endParaRPr lang="en-US" sz="1050" dirty="0">
+              <a:solidFill>
+                <a:srgbClr val="7030A0"/>
+              </a:solidFill>
+            </a:endParaRPr>
+          </a:p>
+        </p:txBody>
+      </p:sp>
+      <p:sp>
+        <p:nvSpPr>
+          <p:cNvPr id="87" name="Rectangle 8">
+            <a:extLst>
+              <a:ext uri="{FF2B5EF4-FFF2-40B4-BE49-F238E27FC236}">
+                <a16:creationId xmlns:a16="http://schemas.microsoft.com/office/drawing/2014/main" id="{7D2E4132-238D-44B5-810E-A7D6F3673928}"/>
+              </a:ext>
+            </a:extLst>
+          </p:cNvPr>
+          <p:cNvSpPr/>
+          <p:nvPr/>
+        </p:nvSpPr>
+        <p:spPr>
+          <a:xfrm>
+            <a:off x="3848100" y="5054098"/>
+            <a:ext cx="1447800" cy="346760"/>
+          </a:xfrm>
+          <a:prstGeom prst="rect">
+            <a:avLst/>
+          </a:prstGeom>
+          <a:ln w="19050">
+            <a:solidFill>
+              <a:srgbClr val="7030A0"/>
+            </a:solidFill>
+          </a:ln>
+          <a:effectLst/>
+        </p:spPr>
+        <p:style>
+          <a:lnRef idx="1">
+            <a:schemeClr val="accent4"/>
+          </a:lnRef>
+          <a:fillRef idx="2">
+            <a:schemeClr val="accent4"/>
+          </a:fillRef>
+          <a:effectRef idx="1">
+            <a:schemeClr val="accent4"/>
+          </a:effectRef>
+          <a:fontRef idx="minor">
+            <a:schemeClr val="dk1"/>
+          </a:fontRef>
+        </p:style>
+        <p:txBody>
+          <a:bodyPr rtlCol="0" anchor="ctr"/>
+          <a:lstStyle/>
+          <a:p>
+            <a:pPr algn="ctr"/>
+            <a:r>
+              <a:rPr lang="en-US" sz="1050" dirty="0" err="1">
+                <a:solidFill>
+                  <a:srgbClr val="7030A0"/>
+                </a:solidFill>
+              </a:rPr>
+              <a:t>UniqueTeamList</a:t>
+            </a:r>
+            <a:endParaRPr lang="en-US" sz="1050" dirty="0">
+              <a:solidFill>
+                <a:srgbClr val="7030A0"/>
+              </a:solidFill>
+            </a:endParaRPr>
+          </a:p>
+        </p:txBody>
+      </p:sp>
+      <p:sp>
+        <p:nvSpPr>
+          <p:cNvPr id="88" name="Rectangle 8">
+            <a:extLst>
+              <a:ext uri="{FF2B5EF4-FFF2-40B4-BE49-F238E27FC236}">
+                <a16:creationId xmlns:a16="http://schemas.microsoft.com/office/drawing/2014/main" id="{80F16E1A-CEF0-4307-8136-0821B85787FA}"/>
+              </a:ext>
+            </a:extLst>
+          </p:cNvPr>
+          <p:cNvSpPr/>
+          <p:nvPr/>
+        </p:nvSpPr>
+        <p:spPr>
+          <a:xfrm>
+            <a:off x="7303542" y="5058522"/>
+            <a:ext cx="1066800" cy="346760"/>
+          </a:xfrm>
+          <a:prstGeom prst="rect">
+            <a:avLst/>
+          </a:prstGeom>
+          <a:ln w="19050">
+            <a:solidFill>
+              <a:srgbClr val="7030A0"/>
+            </a:solidFill>
+          </a:ln>
+          <a:effectLst/>
+        </p:spPr>
+        <p:style>
+          <a:lnRef idx="1">
+            <a:schemeClr val="accent4"/>
+          </a:lnRef>
+          <a:fillRef idx="2">
+            <a:schemeClr val="accent4"/>
+          </a:fillRef>
+          <a:effectRef idx="1">
+            <a:schemeClr val="accent4"/>
+          </a:effectRef>
+          <a:fontRef idx="minor">
+            <a:schemeClr val="dk1"/>
+          </a:fontRef>
+        </p:style>
+        <p:txBody>
+          <a:bodyPr rtlCol="0" anchor="ctr"/>
+          <a:lstStyle/>
+          <a:p>
+            <a:pPr algn="ctr"/>
+            <a:r>
+              <a:rPr lang="en-US" sz="1050" dirty="0" err="1">
+                <a:solidFill>
+                  <a:srgbClr val="7030A0"/>
+                </a:solidFill>
+              </a:rPr>
+              <a:t>TeamName</a:t>
+            </a:r>
+            <a:endParaRPr lang="en-US" sz="1050" dirty="0">
+              <a:solidFill>
+                <a:srgbClr val="7030A0"/>
+              </a:solidFill>
+            </a:endParaRPr>
+          </a:p>
+        </p:txBody>
+      </p:sp>
+      <p:sp>
+        <p:nvSpPr>
+          <p:cNvPr id="90" name="TextBox 89">
+            <a:extLst>
+              <a:ext uri="{FF2B5EF4-FFF2-40B4-BE49-F238E27FC236}">
+                <a16:creationId xmlns:a16="http://schemas.microsoft.com/office/drawing/2014/main" id="{B32ED7B1-9C0F-4372-8DE2-7EABF5105B46}"/>
+              </a:ext>
+            </a:extLst>
+          </p:cNvPr>
+          <p:cNvSpPr txBox="1"/>
+          <p:nvPr/>
+        </p:nvSpPr>
+        <p:spPr>
+          <a:xfrm>
+            <a:off x="5714177" y="5316273"/>
+            <a:ext cx="189257" cy="178683"/>
+          </a:xfrm>
+          <a:prstGeom prst="rect">
+            <a:avLst/>
+          </a:prstGeom>
+          <a:noFill/>
+        </p:spPr>
+        <p:txBody>
+          <a:bodyPr wrap="square" lIns="0" tIns="0" rIns="0" bIns="0" rtlCol="0">
+            <a:noAutofit/>
+          </a:bodyPr>
+          <a:lstStyle/>
+          <a:p>
+            <a:pPr algn="ctr"/>
+            <a:r>
+              <a:rPr lang="en-US" sz="1100" dirty="0">
+                <a:solidFill>
+                  <a:srgbClr val="7030A0"/>
+                </a:solidFill>
+              </a:rPr>
+              <a:t>*</a:t>
+            </a:r>
+            <a:endParaRPr lang="en-SG" sz="1100" dirty="0">
+              <a:solidFill>
+                <a:srgbClr val="7030A0"/>
+              </a:solidFill>
+            </a:endParaRPr>
+          </a:p>
+        </p:txBody>
+      </p:sp>
+      <p:sp>
+        <p:nvSpPr>
+          <p:cNvPr id="91" name="Flowchart: Decision 96">
+            <a:extLst>
+              <a:ext uri="{FF2B5EF4-FFF2-40B4-BE49-F238E27FC236}">
+                <a16:creationId xmlns:a16="http://schemas.microsoft.com/office/drawing/2014/main" id="{CE0F6F72-1A85-4B90-8C2E-36E0BBCCD021}"/>
+              </a:ext>
+            </a:extLst>
+          </p:cNvPr>
+          <p:cNvSpPr/>
+          <p:nvPr/>
+        </p:nvSpPr>
+        <p:spPr>
+          <a:xfrm>
+            <a:off x="5307780" y="5150836"/>
+            <a:ext cx="236048" cy="173380"/>
+          </a:xfrm>
+          <a:prstGeom prst="flowChartDecision">
+            <a:avLst/>
+          </a:prstGeom>
+          <a:noFill/>
+          <a:ln w="19050">
+            <a:solidFill>
+              <a:srgbClr val="7030A0"/>
+            </a:solidFill>
+          </a:ln>
+          <a:effectLst/>
+        </p:spPr>
+        <p:style>
+          <a:lnRef idx="1">
+            <a:schemeClr val="accent6"/>
+          </a:lnRef>
+          <a:fillRef idx="2">
+            <a:schemeClr val="accent6"/>
+          </a:fillRef>
+          <a:effectRef idx="1">
+            <a:schemeClr val="accent6"/>
+          </a:effectRef>
+          <a:fontRef idx="minor">
+            <a:schemeClr val="dk1"/>
+          </a:fontRef>
+        </p:style>
+        <p:txBody>
+          <a:bodyPr rtlCol="0" anchor="ctr"/>
+          <a:lstStyle/>
+          <a:p>
+            <a:pPr algn="ctr"/>
+            <a:endParaRPr lang="en-US" sz="1050"/>
+          </a:p>
+        </p:txBody>
+      </p:sp>
+      <p:cxnSp>
+        <p:nvCxnSpPr>
+          <p:cNvPr id="92" name="Elbow Connector 61">
+            <a:extLst>
+              <a:ext uri="{FF2B5EF4-FFF2-40B4-BE49-F238E27FC236}">
+                <a16:creationId xmlns:a16="http://schemas.microsoft.com/office/drawing/2014/main" id="{19BDF862-3ECE-410B-A4B3-FD87900D74B8}"/>
+              </a:ext>
+            </a:extLst>
+          </p:cNvPr>
+          <p:cNvCxnSpPr>
+            <a:cxnSpLocks/>
+            <a:endCxn id="77" idx="1"/>
+          </p:cNvCxnSpPr>
+          <p:nvPr/>
+        </p:nvCxnSpPr>
+        <p:spPr>
+          <a:xfrm>
+            <a:off x="5555708" y="5236451"/>
+            <a:ext cx="389920" cy="2619"/>
+          </a:xfrm>
+          <a:prstGeom prst="bentConnector3">
+            <a:avLst/>
+          </a:prstGeom>
+          <a:ln w="19050">
+            <a:solidFill>
+              <a:srgbClr val="7030A0"/>
+            </a:solidFill>
+            <a:headEnd type="none" w="med" len="med"/>
+            <a:tailEnd type="arrow" w="med" len="med"/>
+          </a:ln>
+          <a:effectLst/>
+        </p:spPr>
+        <p:style>
+          <a:lnRef idx="1">
+            <a:schemeClr val="accent2"/>
+          </a:lnRef>
+          <a:fillRef idx="2">
+            <a:schemeClr val="accent2"/>
+          </a:fillRef>
+          <a:effectRef idx="1">
+            <a:schemeClr val="accent2"/>
+          </a:effectRef>
+          <a:fontRef idx="minor">
+            <a:schemeClr val="dk1"/>
+          </a:fontRef>
+        </p:style>
+      </p:cxnSp>
+      <p:cxnSp>
+        <p:nvCxnSpPr>
+          <p:cNvPr id="93" name="Elbow Connector 63">
+            <a:extLst>
+              <a:ext uri="{FF2B5EF4-FFF2-40B4-BE49-F238E27FC236}">
+                <a16:creationId xmlns:a16="http://schemas.microsoft.com/office/drawing/2014/main" id="{DD5CE3B6-6A46-48E5-96EB-47C4250617BD}"/>
+              </a:ext>
+            </a:extLst>
+          </p:cNvPr>
+          <p:cNvCxnSpPr>
+            <a:cxnSpLocks/>
+          </p:cNvCxnSpPr>
+          <p:nvPr/>
+        </p:nvCxnSpPr>
+        <p:spPr>
+          <a:xfrm rot="5400000">
+            <a:off x="2963197" y="3836997"/>
+            <a:ext cx="2283499" cy="497463"/>
+          </a:xfrm>
+          <a:prstGeom prst="bentConnector4">
+            <a:avLst>
+              <a:gd name="adj1" fmla="val 49756"/>
+              <a:gd name="adj2" fmla="val 145953"/>
+            </a:avLst>
+          </a:prstGeom>
+          <a:ln w="19050">
+            <a:solidFill>
+              <a:srgbClr val="7030A0"/>
+            </a:solidFill>
+            <a:headEnd type="none" w="med" len="med"/>
+            <a:tailEnd type="arrow" w="med" len="med"/>
+          </a:ln>
+          <a:effectLst/>
+        </p:spPr>
+        <p:style>
+          <a:lnRef idx="1">
+            <a:schemeClr val="accent2"/>
+          </a:lnRef>
+          <a:fillRef idx="2">
+            <a:schemeClr val="accent2"/>
+          </a:fillRef>
+          <a:effectRef idx="1">
+            <a:schemeClr val="accent2"/>
+          </a:effectRef>
+          <a:fontRef idx="minor">
+            <a:schemeClr val="dk1"/>
+          </a:fontRef>
+        </p:style>
+      </p:cxnSp>
+      <p:sp>
+        <p:nvSpPr>
+          <p:cNvPr id="94" name="TextBox 93">
+            <a:extLst>
+              <a:ext uri="{FF2B5EF4-FFF2-40B4-BE49-F238E27FC236}">
+                <a16:creationId xmlns:a16="http://schemas.microsoft.com/office/drawing/2014/main" id="{399B2A4F-A37E-4E3E-A4C7-A29458F076D1}"/>
+              </a:ext>
+            </a:extLst>
+          </p:cNvPr>
+          <p:cNvSpPr txBox="1"/>
+          <p:nvPr/>
+        </p:nvSpPr>
+        <p:spPr>
+          <a:xfrm>
+            <a:off x="3606964" y="5282618"/>
+            <a:ext cx="189257" cy="178683"/>
+          </a:xfrm>
+          <a:prstGeom prst="rect">
+            <a:avLst/>
+          </a:prstGeom>
+          <a:noFill/>
+        </p:spPr>
+        <p:txBody>
+          <a:bodyPr wrap="square" lIns="0" tIns="0" rIns="0" bIns="0" rtlCol="0">
+            <a:noAutofit/>
+          </a:bodyPr>
+          <a:lstStyle/>
+          <a:p>
+            <a:pPr algn="ctr"/>
+            <a:r>
+              <a:rPr lang="en-US" sz="1100" dirty="0">
+                <a:solidFill>
+                  <a:srgbClr val="7030A0"/>
+                </a:solidFill>
+              </a:rPr>
+              <a:t>1</a:t>
+            </a:r>
+            <a:endParaRPr lang="en-SG" sz="1100" dirty="0">
+              <a:solidFill>
+                <a:srgbClr val="7030A0"/>
+              </a:solidFill>
+            </a:endParaRPr>
+          </a:p>
+        </p:txBody>
+      </p:sp>
+      <p:sp>
+        <p:nvSpPr>
+          <p:cNvPr id="95" name="Flowchart: Decision 96">
+            <a:extLst>
+              <a:ext uri="{FF2B5EF4-FFF2-40B4-BE49-F238E27FC236}">
+                <a16:creationId xmlns:a16="http://schemas.microsoft.com/office/drawing/2014/main" id="{37E2BE02-FE6D-49C8-8E0C-D711FC318AF8}"/>
+              </a:ext>
+            </a:extLst>
+          </p:cNvPr>
+          <p:cNvSpPr/>
+          <p:nvPr/>
+        </p:nvSpPr>
+        <p:spPr>
+          <a:xfrm>
+            <a:off x="6667321" y="5139628"/>
+            <a:ext cx="236048" cy="173380"/>
+          </a:xfrm>
+          <a:prstGeom prst="flowChartDecision">
+            <a:avLst/>
+          </a:prstGeom>
+          <a:solidFill>
+            <a:srgbClr val="7030A0"/>
+          </a:solidFill>
+          <a:ln w="19050">
+            <a:solidFill>
+              <a:srgbClr val="7030A0"/>
+            </a:solidFill>
+          </a:ln>
+          <a:effectLst/>
+        </p:spPr>
+        <p:style>
+          <a:lnRef idx="1">
+            <a:schemeClr val="accent6"/>
+          </a:lnRef>
+          <a:fillRef idx="2">
+            <a:schemeClr val="accent6"/>
+          </a:fillRef>
+          <a:effectRef idx="1">
+            <a:schemeClr val="accent6"/>
+          </a:effectRef>
+          <a:fontRef idx="minor">
+            <a:schemeClr val="dk1"/>
+          </a:fontRef>
+        </p:style>
+        <p:txBody>
+          <a:bodyPr rtlCol="0" anchor="ctr"/>
+          <a:lstStyle/>
+          <a:p>
+            <a:pPr algn="ctr"/>
+            <a:endParaRPr lang="en-US" sz="1050"/>
+          </a:p>
+        </p:txBody>
+      </p:sp>
+      <p:cxnSp>
+        <p:nvCxnSpPr>
+          <p:cNvPr id="96" name="Elbow Connector 71">
+            <a:extLst>
+              <a:ext uri="{FF2B5EF4-FFF2-40B4-BE49-F238E27FC236}">
+                <a16:creationId xmlns:a16="http://schemas.microsoft.com/office/drawing/2014/main" id="{E12EC7C7-55B2-424D-A971-535D10427F6E}"/>
+              </a:ext>
+            </a:extLst>
+          </p:cNvPr>
+          <p:cNvCxnSpPr>
+            <a:cxnSpLocks/>
+          </p:cNvCxnSpPr>
+          <p:nvPr/>
+        </p:nvCxnSpPr>
+        <p:spPr>
+          <a:xfrm>
+            <a:off x="6874976" y="5223272"/>
+            <a:ext cx="434402" cy="777"/>
+          </a:xfrm>
+          <a:prstGeom prst="bentConnector3">
+            <a:avLst/>
+          </a:prstGeom>
+          <a:ln w="19050">
+            <a:solidFill>
+              <a:srgbClr val="7030A0"/>
+            </a:solidFill>
+            <a:headEnd type="none" w="med" len="med"/>
+            <a:tailEnd type="arrow" w="med" len="med"/>
+          </a:ln>
+          <a:effectLst/>
+        </p:spPr>
+        <p:style>
+          <a:lnRef idx="1">
+            <a:schemeClr val="accent2"/>
+          </a:lnRef>
+          <a:fillRef idx="2">
+            <a:schemeClr val="accent2"/>
+          </a:fillRef>
+          <a:effectRef idx="1">
+            <a:schemeClr val="accent2"/>
+          </a:effectRef>
+          <a:fontRef idx="minor">
+            <a:schemeClr val="dk1"/>
+          </a:fontRef>
+        </p:style>
+      </p:cxnSp>
+      <p:sp>
+        <p:nvSpPr>
+          <p:cNvPr id="98" name="Isosceles Triangle 102">
+            <a:extLst>
+              <a:ext uri="{FF2B5EF4-FFF2-40B4-BE49-F238E27FC236}">
+                <a16:creationId xmlns:a16="http://schemas.microsoft.com/office/drawing/2014/main" id="{26DDDFDA-B48F-4641-801F-F9B612711506}"/>
+              </a:ext>
+            </a:extLst>
+          </p:cNvPr>
+          <p:cNvSpPr/>
+          <p:nvPr/>
+        </p:nvSpPr>
+        <p:spPr>
+          <a:xfrm rot="10800000" flipV="1">
+            <a:off x="6164469" y="4584395"/>
+            <a:ext cx="270504" cy="175523"/>
+          </a:xfrm>
+          <a:prstGeom prst="triangle">
+            <a:avLst/>
+          </a:prstGeom>
+          <a:ln w="19050">
+            <a:solidFill>
+              <a:srgbClr val="7030A0"/>
+            </a:solidFill>
+          </a:ln>
+          <a:effectLst/>
+        </p:spPr>
+        <p:style>
+          <a:lnRef idx="1">
+            <a:schemeClr val="accent4"/>
+          </a:lnRef>
+          <a:fillRef idx="2">
+            <a:schemeClr val="accent4"/>
+          </a:fillRef>
+          <a:effectRef idx="1">
+            <a:schemeClr val="accent4"/>
+          </a:effectRef>
+          <a:fontRef idx="minor">
+            <a:schemeClr val="dk1"/>
+          </a:fontRef>
+        </p:style>
+        <p:txBody>
+          <a:bodyPr rtlCol="0" anchor="ctr"/>
+          <a:lstStyle/>
+          <a:p>
+            <a:pPr algn="ctr"/>
+            <a:endParaRPr lang="en-SG" sz="1050" b="1">
+              <a:solidFill>
+                <a:srgbClr val="92D050"/>
+              </a:solidFill>
+            </a:endParaRPr>
+          </a:p>
+        </p:txBody>
+      </p:sp>
+      <p:cxnSp>
+        <p:nvCxnSpPr>
+          <p:cNvPr id="101" name="Straight Connector 100">
+            <a:extLst>
+              <a:ext uri="{FF2B5EF4-FFF2-40B4-BE49-F238E27FC236}">
+                <a16:creationId xmlns:a16="http://schemas.microsoft.com/office/drawing/2014/main" id="{47B87F1E-72FD-4EC4-A6C0-24BF8C6F39F0}"/>
+              </a:ext>
+            </a:extLst>
+          </p:cNvPr>
+          <p:cNvCxnSpPr>
+            <a:cxnSpLocks/>
+            <a:stCxn id="98" idx="3"/>
+            <a:endCxn id="77" idx="0"/>
+          </p:cNvCxnSpPr>
+          <p:nvPr/>
+        </p:nvCxnSpPr>
+        <p:spPr>
+          <a:xfrm>
+            <a:off x="6299721" y="4759918"/>
+            <a:ext cx="0" cy="305772"/>
+          </a:xfrm>
+          <a:prstGeom prst="line">
+            <a:avLst/>
+          </a:prstGeom>
+          <a:ln w="19050"/>
+        </p:spPr>
+        <p:style>
+          <a:lnRef idx="1">
+            <a:schemeClr val="accent4"/>
+          </a:lnRef>
+          <a:fillRef idx="0">
+            <a:schemeClr val="accent4"/>
+          </a:fillRef>
+          <a:effectRef idx="0">
+            <a:schemeClr val="accent4"/>
+          </a:effectRef>
+          <a:fontRef idx="minor">
+            <a:schemeClr val="tx1"/>
+          </a:fontRef>
+        </p:style>
+      </p:cxnSp>
     </p:spTree>
     <p:extLst>
       <p:ext uri="{BB962C8B-B14F-4D97-AF65-F5344CB8AC3E}">
@@ -5763,13 +6733,6 @@
   <p:clrMapOvr>
     <a:masterClrMapping/>
   </p:clrMapOvr>
-  <p:timing>
-    <p:tnLst>
-      <p:par>
-        <p:cTn id="1" dur="indefinite" restart="never" nodeType="tmRoot"/>
-      </p:par>
-    </p:tnLst>
-  </p:timing>
 </p:sld>
 </file>
 

</xml_diff>

<commit_message>
Added player component to dg
</commit_message>
<xml_diff>
--- a/docs/diagrams/ModelComponentClassDiagram.pptx
+++ b/docs/diagrams/ModelComponentClassDiagram.pptx
@@ -3450,8 +3450,8 @@
         </p:nvSpPr>
         <p:spPr>
           <a:xfrm>
-            <a:off x="1119865" y="1727200"/>
-            <a:ext cx="7490735" cy="3987800"/>
+            <a:off x="1207632" y="1750548"/>
+            <a:ext cx="7631568" cy="4342592"/>
           </a:xfrm>
           <a:prstGeom prst="roundRect">
             <a:avLst>
@@ -6063,7 +6063,7 @@
         </p:nvSpPr>
         <p:spPr>
           <a:xfrm>
-            <a:off x="5945628" y="5065690"/>
+            <a:off x="5951018" y="5342771"/>
             <a:ext cx="708186" cy="346760"/>
           </a:xfrm>
           <a:prstGeom prst="rect">
@@ -6120,7 +6120,7 @@
         </p:nvSpPr>
         <p:spPr>
           <a:xfrm>
-            <a:off x="5575821" y="4229782"/>
+            <a:off x="5581211" y="4506863"/>
             <a:ext cx="1447800" cy="346760"/>
           </a:xfrm>
           <a:prstGeom prst="rect">
@@ -6182,7 +6182,7 @@
         </p:nvSpPr>
         <p:spPr>
           <a:xfrm>
-            <a:off x="3848100" y="5054098"/>
+            <a:off x="3853490" y="5331179"/>
             <a:ext cx="1447800" cy="346760"/>
           </a:xfrm>
           <a:prstGeom prst="rect">
@@ -6244,7 +6244,7 @@
         </p:nvSpPr>
         <p:spPr>
           <a:xfrm>
-            <a:off x="7303542" y="5058522"/>
+            <a:off x="7308932" y="5335603"/>
             <a:ext cx="1066800" cy="346760"/>
           </a:xfrm>
           <a:prstGeom prst="rect">
@@ -6306,7 +6306,7 @@
         </p:nvSpPr>
         <p:spPr>
           <a:xfrm>
-            <a:off x="5714177" y="5316273"/>
+            <a:off x="5719567" y="5593354"/>
             <a:ext cx="189257" cy="178683"/>
           </a:xfrm>
           <a:prstGeom prst="rect">
@@ -6351,7 +6351,7 @@
         </p:nvSpPr>
         <p:spPr>
           <a:xfrm>
-            <a:off x="5307780" y="5150836"/>
+            <a:off x="5313170" y="5427917"/>
             <a:ext cx="236048" cy="173380"/>
           </a:xfrm>
           <a:prstGeom prst="flowChartDecision">
@@ -6405,7 +6405,7 @@
         </p:nvCxnSpPr>
         <p:spPr>
           <a:xfrm>
-            <a:off x="5555708" y="5236451"/>
+            <a:off x="5561098" y="5513532"/>
             <a:ext cx="389920" cy="2619"/>
           </a:xfrm>
           <a:prstGeom prst="bentConnector3">
@@ -6498,7 +6498,7 @@
         </p:nvSpPr>
         <p:spPr>
           <a:xfrm>
-            <a:off x="3606964" y="5282618"/>
+            <a:off x="3612354" y="5559699"/>
             <a:ext cx="189257" cy="178683"/>
           </a:xfrm>
           <a:prstGeom prst="rect">
@@ -6543,7 +6543,7 @@
         </p:nvSpPr>
         <p:spPr>
           <a:xfrm>
-            <a:off x="6667321" y="5139628"/>
+            <a:off x="6672711" y="5416709"/>
             <a:ext cx="236048" cy="173380"/>
           </a:xfrm>
           <a:prstGeom prst="flowChartDecision">
@@ -6598,7 +6598,7 @@
         </p:nvCxnSpPr>
         <p:spPr>
           <a:xfrm>
-            <a:off x="6874976" y="5223272"/>
+            <a:off x="6880366" y="5500353"/>
             <a:ext cx="434402" cy="777"/>
           </a:xfrm>
           <a:prstGeom prst="bentConnector3">
@@ -6642,7 +6642,7 @@
         </p:nvSpPr>
         <p:spPr>
           <a:xfrm rot="10800000" flipV="1">
-            <a:off x="6164469" y="4584395"/>
+            <a:off x="6169859" y="4861476"/>
             <a:ext cx="270504" cy="175523"/>
           </a:xfrm>
           <a:prstGeom prst="triangle">
@@ -6700,7 +6700,7 @@
         </p:nvCxnSpPr>
         <p:spPr>
           <a:xfrm>
-            <a:off x="6299721" y="4759918"/>
+            <a:off x="6305111" y="5036999"/>
             <a:ext cx="0" cy="305772"/>
           </a:xfrm>
           <a:prstGeom prst="line">
@@ -6720,6 +6720,162 @@
           </a:effectRef>
           <a:fontRef idx="minor">
             <a:schemeClr val="tx1"/>
+          </a:fontRef>
+        </p:style>
+      </p:cxnSp>
+      <p:cxnSp>
+        <p:nvCxnSpPr>
+          <p:cNvPr id="72" name="Elbow Connector 85">
+            <a:extLst>
+              <a:ext uri="{FF2B5EF4-FFF2-40B4-BE49-F238E27FC236}">
+                <a16:creationId xmlns:a16="http://schemas.microsoft.com/office/drawing/2014/main" id="{C003F1FC-AB8F-41F4-906D-FF070CB0664E}"/>
+              </a:ext>
+            </a:extLst>
+          </p:cNvPr>
+          <p:cNvCxnSpPr>
+            <a:cxnSpLocks/>
+          </p:cNvCxnSpPr>
+          <p:nvPr/>
+        </p:nvCxnSpPr>
+        <p:spPr>
+          <a:xfrm rot="16200000" flipH="1">
+            <a:off x="6958687" y="4794664"/>
+            <a:ext cx="1073029" cy="3"/>
+          </a:xfrm>
+          <a:prstGeom prst="bentConnector3">
+            <a:avLst>
+              <a:gd name="adj1" fmla="val 50000"/>
+            </a:avLst>
+          </a:prstGeom>
+          <a:ln w="19050">
+            <a:solidFill>
+              <a:srgbClr val="7030A0"/>
+            </a:solidFill>
+            <a:headEnd type="none" w="med" len="med"/>
+            <a:tailEnd type="arrow" w="med" len="med"/>
+          </a:ln>
+          <a:effectLst/>
+        </p:spPr>
+        <p:style>
+          <a:lnRef idx="1">
+            <a:schemeClr val="accent2"/>
+          </a:lnRef>
+          <a:fillRef idx="2">
+            <a:schemeClr val="accent2"/>
+          </a:fillRef>
+          <a:effectRef idx="1">
+            <a:schemeClr val="accent2"/>
+          </a:effectRef>
+          <a:fontRef idx="minor">
+            <a:schemeClr val="dk1"/>
+          </a:fontRef>
+        </p:style>
+      </p:cxnSp>
+      <p:sp>
+        <p:nvSpPr>
+          <p:cNvPr id="89" name="Rectangle 8">
+            <a:extLst>
+              <a:ext uri="{FF2B5EF4-FFF2-40B4-BE49-F238E27FC236}">
+                <a16:creationId xmlns:a16="http://schemas.microsoft.com/office/drawing/2014/main" id="{472B30C0-A09B-4E54-9D3C-99931D4D73F4}"/>
+              </a:ext>
+            </a:extLst>
+          </p:cNvPr>
+          <p:cNvSpPr/>
+          <p:nvPr/>
+        </p:nvSpPr>
+        <p:spPr>
+          <a:xfrm>
+            <a:off x="7719771" y="4869628"/>
+            <a:ext cx="978592" cy="285783"/>
+          </a:xfrm>
+          <a:prstGeom prst="rect">
+            <a:avLst/>
+          </a:prstGeom>
+          <a:ln w="19050">
+            <a:solidFill>
+              <a:srgbClr val="7030A0"/>
+            </a:solidFill>
+          </a:ln>
+          <a:effectLst/>
+        </p:spPr>
+        <p:style>
+          <a:lnRef idx="1">
+            <a:schemeClr val="accent4"/>
+          </a:lnRef>
+          <a:fillRef idx="2">
+            <a:schemeClr val="accent4"/>
+          </a:fillRef>
+          <a:effectRef idx="1">
+            <a:schemeClr val="accent4"/>
+          </a:effectRef>
+          <a:fontRef idx="minor">
+            <a:schemeClr val="dk1"/>
+          </a:fontRef>
+        </p:style>
+        <p:txBody>
+          <a:bodyPr rtlCol="0" anchor="ctr"/>
+          <a:lstStyle/>
+          <a:p>
+            <a:pPr algn="ctr"/>
+            <a:r>
+              <a:rPr lang="en-US" sz="1050" dirty="0" err="1">
+                <a:solidFill>
+                  <a:srgbClr val="7030A0"/>
+                </a:solidFill>
+              </a:rPr>
+              <a:t>UniqueTagList</a:t>
+            </a:r>
+            <a:endParaRPr lang="en-SG" sz="1050" dirty="0">
+              <a:solidFill>
+                <a:srgbClr val="7030A0"/>
+              </a:solidFill>
+            </a:endParaRPr>
+          </a:p>
+        </p:txBody>
+      </p:sp>
+      <p:cxnSp>
+        <p:nvCxnSpPr>
+          <p:cNvPr id="102" name="Elbow Connector 85">
+            <a:extLst>
+              <a:ext uri="{FF2B5EF4-FFF2-40B4-BE49-F238E27FC236}">
+                <a16:creationId xmlns:a16="http://schemas.microsoft.com/office/drawing/2014/main" id="{4D1304EA-DBE7-42CA-AA7F-F38B223CD936}"/>
+              </a:ext>
+            </a:extLst>
+          </p:cNvPr>
+          <p:cNvCxnSpPr>
+            <a:cxnSpLocks/>
+          </p:cNvCxnSpPr>
+          <p:nvPr/>
+        </p:nvCxnSpPr>
+        <p:spPr>
+          <a:xfrm rot="16200000" flipH="1">
+            <a:off x="7161930" y="4442681"/>
+            <a:ext cx="880334" cy="224573"/>
+          </a:xfrm>
+          <a:prstGeom prst="bentConnector2">
+            <a:avLst/>
+          </a:prstGeom>
+          <a:ln w="19050">
+            <a:solidFill>
+              <a:srgbClr val="7030A0"/>
+            </a:solidFill>
+            <a:headEnd type="none" w="med" len="med"/>
+            <a:tailEnd type="arrow" w="med" len="med"/>
+          </a:ln>
+          <a:effectLst/>
+        </p:spPr>
+        <p:style>
+          <a:lnRef idx="1">
+            <a:schemeClr val="accent2"/>
+          </a:lnRef>
+          <a:fillRef idx="2">
+            <a:schemeClr val="accent2"/>
+          </a:fillRef>
+          <a:effectRef idx="1">
+            <a:schemeClr val="accent2"/>
+          </a:effectRef>
+          <a:fontRef idx="minor">
+            <a:schemeClr val="dk1"/>
           </a:fontRef>
         </p:style>
       </p:cxnSp>

</xml_diff>